<commit_message>
Execute from any directory
No longer requies execution from model directory
</commit_message>
<xml_diff>
--- a/RsNlme/inst/doc/RsNlmeCheatSheet.pptx
+++ b/RsNlme/inst/doc/RsNlmeCheatSheet.pptx
@@ -316,7 +316,7 @@
   </p:defaultTextStyle>
   <p:extLst>
     <p:ext uri="{EFAFB233-063F-42B5-8137-9DF3F51BA10A}">
-      <p15:sldGuideLst xmlns:p15="http://schemas.microsoft.com/office/powerpoint/2012/main">
+      <p15:sldGuideLst xmlns="" xmlns:p15="http://schemas.microsoft.com/office/powerpoint/2012/main">
         <p15:guide id="1" orient="horz" pos="951" userDrawn="1">
           <p15:clr>
             <a:srgbClr val="A4A3A4"/>
@@ -330,7 +330,7 @@
       </p15:sldGuideLst>
     </p:ext>
     <p:ext uri="{2D200454-40CA-4A62-9FC3-DE9A4176ACB9}">
-      <p15:notesGuideLst xmlns:p15="http://schemas.microsoft.com/office/powerpoint/2012/main"/>
+      <p15:notesGuideLst xmlns="" xmlns:p15="http://schemas.microsoft.com/office/powerpoint/2012/main"/>
     </p:ext>
   </p:extLst>
 </p:presentation>
@@ -341,7 +341,7 @@
   <p:cmAuthor id="1" name="Shuhua Hu" initials="SH" lastIdx="7" clrIdx="0">
     <p:extLst>
       <p:ext uri="{19B8F6BF-5375-455C-9EA6-DF929625EA0E}">
-        <p15:presenceInfo xmlns:p15="http://schemas.microsoft.com/office/powerpoint/2012/main" userId="S-1-5-21-3290713378-1251487440-3091856871-2966" providerId="AD"/>
+        <p15:presenceInfo xmlns="" xmlns:p15="http://schemas.microsoft.com/office/powerpoint/2012/main" userId="S-1-5-21-3290713378-1251487440-3091856871-2966" providerId="AD"/>
       </p:ext>
     </p:extLst>
   </p:cmAuthor>
@@ -390,7 +390,7 @@
           </a:prstGeom>
         </p:spPr>
         <p:txBody>
-          <a:bodyPr vert="horz" lIns="96653" tIns="48327" rIns="96653" bIns="48327" rtlCol="0"/>
+          <a:bodyPr vert="horz" lIns="96638" tIns="48320" rIns="96638" bIns="48320" rtlCol="0"/>
           <a:lstStyle>
             <a:lvl1pPr algn="l">
               <a:defRPr sz="1200"/>
@@ -421,7 +421,7 @@
           </a:prstGeom>
         </p:spPr>
         <p:txBody>
-          <a:bodyPr vert="horz" lIns="96653" tIns="48327" rIns="96653" bIns="48327" rtlCol="0"/>
+          <a:bodyPr vert="horz" lIns="96638" tIns="48320" rIns="96638" bIns="48320" rtlCol="0"/>
           <a:lstStyle>
             <a:lvl1pPr algn="r">
               <a:defRPr sz="1200"/>
@@ -431,7 +431,7 @@
             <a:fld id="{14A1A45B-F66E-48A2-89C5-3AD170776287}" type="datetimeFigureOut">
               <a:rPr lang="da-DK" smtClean="0"/>
               <a:pPr/>
-              <a:t>09-05-2019</a:t>
+              <a:t>18-07-2019</a:t>
             </a:fld>
             <a:endParaRPr lang="da-DK"/>
           </a:p>
@@ -457,7 +457,7 @@
           </a:prstGeom>
         </p:spPr>
         <p:txBody>
-          <a:bodyPr vert="horz" lIns="96653" tIns="48327" rIns="96653" bIns="48327" rtlCol="0" anchor="b"/>
+          <a:bodyPr vert="horz" lIns="96638" tIns="48320" rIns="96638" bIns="48320" rtlCol="0" anchor="b"/>
           <a:lstStyle>
             <a:lvl1pPr algn="l">
               <a:defRPr sz="1200"/>
@@ -488,7 +488,7 @@
           </a:prstGeom>
         </p:spPr>
         <p:txBody>
-          <a:bodyPr vert="horz" lIns="96653" tIns="48327" rIns="96653" bIns="48327" rtlCol="0" anchor="b"/>
+          <a:bodyPr vert="horz" lIns="96638" tIns="48320" rIns="96638" bIns="48320" rtlCol="0" anchor="b"/>
           <a:lstStyle>
             <a:lvl1pPr algn="r">
               <a:defRPr sz="1200"/>
@@ -507,7 +507,7 @@
     </p:spTree>
     <p:extLst>
       <p:ext uri="{BB962C8B-B14F-4D97-AF65-F5344CB8AC3E}">
-        <p14:creationId xmlns:p14="http://schemas.microsoft.com/office/powerpoint/2010/main" val="1358073725"/>
+        <p14:creationId xmlns="" xmlns:p14="http://schemas.microsoft.com/office/powerpoint/2010/main" val="1358073725"/>
       </p:ext>
     </p:extLst>
   </p:cSld>
@@ -638,7 +638,7 @@
           </a:prstGeom>
         </p:spPr>
         <p:txBody>
-          <a:bodyPr lIns="96653" tIns="48327" rIns="96653" bIns="48327"/>
+          <a:bodyPr lIns="96638" tIns="48320" rIns="96638" bIns="48320"/>
           <a:lstStyle/>
           <a:p>
             <a:endParaRPr/>
@@ -657,7 +657,7 @@
         </p:nvSpPr>
         <p:spPr>
           <a:xfrm>
-            <a:off x="975360" y="4560570"/>
+            <a:off x="975361" y="4560571"/>
             <a:ext cx="5364480" cy="4320540"/>
           </a:xfrm>
           <a:prstGeom prst="rect">
@@ -665,7 +665,7 @@
           </a:prstGeom>
         </p:spPr>
         <p:txBody>
-          <a:bodyPr lIns="96653" tIns="48327" rIns="96653" bIns="48327"/>
+          <a:bodyPr lIns="96638" tIns="48320" rIns="96638" bIns="48320"/>
           <a:lstStyle/>
           <a:p>
             <a:endParaRPr/>
@@ -675,7 +675,7 @@
     </p:spTree>
     <p:extLst>
       <p:ext uri="{BB962C8B-B14F-4D97-AF65-F5344CB8AC3E}">
-        <p14:creationId xmlns:p14="http://schemas.microsoft.com/office/powerpoint/2010/main" val="817923562"/>
+        <p14:creationId xmlns="" xmlns:p14="http://schemas.microsoft.com/office/powerpoint/2010/main" val="817923562"/>
       </p:ext>
     </p:extLst>
   </p:cSld>
@@ -840,7 +840,7 @@
     </p:spTree>
     <p:extLst>
       <p:ext uri="{BB962C8B-B14F-4D97-AF65-F5344CB8AC3E}">
-        <p14:creationId xmlns:p14="http://schemas.microsoft.com/office/powerpoint/2010/main" val="3787924101"/>
+        <p14:creationId xmlns="" xmlns:p14="http://schemas.microsoft.com/office/powerpoint/2010/main" val="3787924101"/>
       </p:ext>
     </p:extLst>
   </p:cSld>
@@ -906,7 +906,7 @@
     </p:spTree>
     <p:extLst>
       <p:ext uri="{BB962C8B-B14F-4D97-AF65-F5344CB8AC3E}">
-        <p14:creationId xmlns:p14="http://schemas.microsoft.com/office/powerpoint/2010/main" val="338885873"/>
+        <p14:creationId xmlns="" xmlns:p14="http://schemas.microsoft.com/office/powerpoint/2010/main" val="338885873"/>
       </p:ext>
     </p:extLst>
   </p:cSld>
@@ -5098,11 +5098,7 @@
               </a:r>
               <a:r>
                 <a:rPr lang="en-US" sz="1050" b="0" dirty="0" smtClean="0"/>
-                <a:t>=0.75</a:t>
-              </a:r>
-              <a:r>
-                <a:rPr lang="en-US" sz="1050" b="0" dirty="0" smtClean="0"/>
-                <a:t>,</a:t>
+                <a:t>=0.75,</a:t>
               </a:r>
             </a:p>
             <a:p>
@@ -5178,11 +5174,7 @@
               </a:r>
               <a:r>
                 <a:rPr lang="en-US" sz="1000" b="0" dirty="0" err="1" smtClean="0"/>
-                <a:t>,“</a:t>
-              </a:r>
-              <a:r>
-                <a:rPr lang="en-US" sz="1000" b="0" dirty="0" err="1" smtClean="0"/>
-                <a:t>V</a:t>
+                <a:t>,“V</a:t>
               </a:r>
               <a:r>
                 <a:rPr lang="en-US" sz="1000" b="0" dirty="0" smtClean="0"/>
@@ -5793,11 +5785,7 @@
                 </a:r>
                 <a:r>
                   <a:rPr lang="en-US" sz="900" b="0" i="1" dirty="0" err="1" smtClean="0"/>
-                  <a:t>input,</a:t>
-                </a:r>
-                <a:r>
-                  <a:rPr lang="en-US" sz="900" b="0" i="1" dirty="0" err="1" smtClean="0"/>
-                  <a:t>aes</a:t>
+                  <a:t>input,aes</a:t>
                 </a:r>
                 <a:r>
                   <a:rPr lang="en-US" sz="900" b="0" i="1" dirty="0" smtClean="0"/>
@@ -6012,9 +6000,9 @@
         <p:grpSpPr>
           <a:xfrm>
             <a:off x="4706556" y="8318128"/>
-            <a:ext cx="4465416" cy="1213769"/>
+            <a:ext cx="4465416" cy="1601243"/>
             <a:chOff x="4527064" y="6051585"/>
-            <a:chExt cx="4380716" cy="2607856"/>
+            <a:chExt cx="4380716" cy="3440367"/>
           </a:xfrm>
         </p:grpSpPr>
         <p:sp>
@@ -6073,7 +6061,7 @@
           <p:spPr>
             <a:xfrm>
               <a:off x="4758690" y="7541186"/>
-              <a:ext cx="4061460" cy="1118255"/>
+              <a:ext cx="4061460" cy="1950766"/>
             </a:xfrm>
             <a:prstGeom prst="rect">
               <a:avLst/>
@@ -6084,24 +6072,6 @@
               <a:spAutoFit/>
             </a:bodyPr>
             <a:lstStyle/>
-            <a:p>
-              <a:r>
-                <a:rPr lang="en-US" b="0" i="1" dirty="0" smtClean="0"/>
-                <a:t>dataset</a:t>
-              </a:r>
-              <a:r>
-                <a:rPr lang="en-US" dirty="0" smtClean="0"/>
-                <a:t>=</a:t>
-              </a:r>
-              <a:r>
-                <a:rPr lang="en-US" dirty="0" err="1" smtClean="0"/>
-                <a:t>NlmeDataset</a:t>
-              </a:r>
-              <a:r>
-                <a:rPr lang="en-US" dirty="0" smtClean="0"/>
-                <a:t>()</a:t>
-              </a:r>
-            </a:p>
             <a:p>
               <a:r>
                 <a:rPr lang="en-US" dirty="0" err="1" smtClean="0"/>
@@ -7417,8 +7387,8 @@
           </a:p>
         </p:txBody>
       </p:sp>
-      <mc:AlternateContent xmlns:mc="http://schemas.openxmlformats.org/markup-compatibility/2006" xmlns:p14="http://schemas.microsoft.com/office/powerpoint/2010/main">
-        <mc:Choice Requires="p14">
+      <mc:AlternateContent xmlns:mc="http://schemas.openxmlformats.org/markup-compatibility/2006">
+        <mc:Choice xmlns="" xmlns:p14="http://schemas.microsoft.com/office/powerpoint/2010/main" Requires="p14">
           <p:contentPart p14:bwMode="auto" r:id="rId5">
             <p14:nvContentPartPr>
               <p14:cNvPr id="3" name="Ink 2"/>
@@ -7431,7 +7401,7 @@
             </p14:xfrm>
           </p:contentPart>
         </mc:Choice>
-        <mc:Fallback xmlns="">
+        <mc:Fallback>
           <p:pic>
             <p:nvPicPr>
               <p:cNvPr id="3" name="Ink 2"/>
@@ -7898,7 +7868,7 @@
     </p:spTree>
     <p:extLst>
       <p:ext uri="{BB962C8B-B14F-4D97-AF65-F5344CB8AC3E}">
-        <p14:creationId xmlns:p14="http://schemas.microsoft.com/office/powerpoint/2010/main" val="2610565094"/>
+        <p14:creationId xmlns="" xmlns:p14="http://schemas.microsoft.com/office/powerpoint/2010/main" val="2610565094"/>
       </p:ext>
     </p:extLst>
   </p:cSld>
@@ -9969,7 +9939,7 @@
               </a:r>
               <a:r>
                 <a:rPr lang="en-US" b="0" dirty="0" smtClean="0"/>
-                <a:t>, dataset, </a:t>
+                <a:t>, </a:t>
               </a:r>
               <a:r>
                 <a:rPr lang="en-US" b="0" dirty="0" err="1" smtClean="0"/>
@@ -10009,7 +9979,7 @@
               </a:r>
               <a:r>
                 <a:rPr lang="en-US" b="0" i="1" dirty="0" err="1" smtClean="0"/>
-                <a:t>host,dataset,engineParams</a:t>
+                <a:t>host,engineParams</a:t>
               </a:r>
               <a:r>
                 <a:rPr lang="en-US" sz="800" dirty="0" smtClean="0"/>
@@ -10226,7 +10196,7 @@
               </a:r>
               <a:r>
                 <a:rPr lang="en-US" b="0" dirty="0" smtClean="0"/>
-                <a:t>, dataset, </a:t>
+                <a:t>, </a:t>
               </a:r>
               <a:r>
                 <a:rPr lang="en-US" b="0" dirty="0" err="1" smtClean="0"/>
@@ -10338,7 +10308,7 @@
               </a:r>
               <a:r>
                 <a:rPr lang="en-US" b="0" dirty="0" err="1" smtClean="0"/>
-                <a:t>defaultHost,dataset,simParams,model</a:t>
+                <a:t>defaultHost,simParams,model</a:t>
               </a:r>
               <a:r>
                 <a:rPr lang="en-US" b="0" dirty="0" smtClean="0"/>
@@ -10495,7 +10465,7 @@
               </a:r>
               <a:r>
                 <a:rPr lang="en-US" b="0" dirty="0" smtClean="0"/>
-                <a:t>, dataset, </a:t>
+                <a:t>, </a:t>
               </a:r>
               <a:r>
                 <a:rPr lang="en-US" b="0" dirty="0" err="1" smtClean="0"/>
@@ -10551,7 +10521,7 @@
               </a:r>
               <a:r>
                 <a:rPr lang="en-US" b="0" dirty="0" smtClean="0"/>
-                <a:t>, dataset, </a:t>
+                <a:t>, </a:t>
               </a:r>
               <a:r>
                 <a:rPr lang="en-US" b="0" dirty="0" err="1" smtClean="0"/>
@@ -10599,7 +10569,11 @@
               </a:r>
               <a:r>
                 <a:rPr lang="en-US" b="0" dirty="0" smtClean="0"/>
-                <a:t>(0.01, 0.001, "-2LL") job=</a:t>
+                <a:t>(0.01, 0.001, "-2LL") </a:t>
+              </a:r>
+              <a:r>
+                <a:rPr lang="en-US" b="0" dirty="0" smtClean="0"/>
+                <a:t>job=</a:t>
               </a:r>
               <a:r>
                 <a:rPr lang="en-US" dirty="0" err="1" smtClean="0"/>
@@ -10607,7 +10581,7 @@
               </a:r>
               <a:r>
                 <a:rPr lang="en-US" b="0" dirty="0" smtClean="0"/>
-                <a:t>(host, dataset, </a:t>
+                <a:t>(host, </a:t>
               </a:r>
               <a:r>
                 <a:rPr lang="en-US" b="0" dirty="0" err="1" smtClean="0"/>
@@ -10848,7 +10822,7 @@
               </a:r>
               <a:r>
                 <a:rPr lang="en-US" b="0" dirty="0" smtClean="0"/>
-                <a:t>, dataset, </a:t>
+                <a:t>, </a:t>
               </a:r>
               <a:r>
                 <a:rPr lang="en-US" b="0" dirty="0" err="1" smtClean="0"/>
@@ -10864,7 +10838,15 @@
               </a:r>
               <a:r>
                 <a:rPr lang="en-US" b="0" dirty="0" smtClean="0"/>
-                <a:t>, 	model, </a:t>
+                <a:t>, </a:t>
+              </a:r>
+              <a:r>
+                <a:rPr lang="en-US" b="0" dirty="0" smtClean="0"/>
+                <a:t>model</a:t>
+              </a:r>
+              <a:r>
+                <a:rPr lang="en-US" b="0" dirty="0" smtClean="0"/>
+                <a:t>, </a:t>
               </a:r>
               <a:r>
                 <a:rPr lang="en-US" b="0" dirty="0" err="1" smtClean="0"/>
@@ -10936,7 +10918,15 @@
               </a:r>
               <a:r>
                 <a:rPr lang="en-US" b="0" dirty="0" err="1" smtClean="0"/>
-                <a:t>defaultHost,dataset,params</a:t>
+                <a:t>defaultHost</a:t>
+              </a:r>
+              <a:r>
+                <a:rPr lang="en-US" b="0" dirty="0" smtClean="0"/>
+                <a:t>, </a:t>
+              </a:r>
+              <a:r>
+                <a:rPr lang="en-US" b="0" dirty="0" err="1" smtClean="0"/>
+                <a:t>params</a:t>
               </a:r>
               <a:r>
                 <a:rPr lang="en-US" b="0" dirty="0" smtClean="0"/>
@@ -10950,7 +10940,15 @@
               </a:r>
               <a:r>
                 <a:rPr lang="en-US" b="0" dirty="0" err="1" smtClean="0"/>
-                <a:t>bootParams,model,TRUE</a:t>
+                <a:t>bootParams</a:t>
+              </a:r>
+              <a:r>
+                <a:rPr lang="en-US" b="0" dirty="0" smtClean="0"/>
+                <a:t>, </a:t>
+              </a:r>
+              <a:r>
+                <a:rPr lang="en-US" b="0" dirty="0" err="1" smtClean="0"/>
+                <a:t>model,TRUE</a:t>
               </a:r>
               <a:r>
                 <a:rPr lang="en-US" b="0" dirty="0" smtClean="0"/>
@@ -11014,7 +11012,7 @@
             </a:r>
             <a:r>
               <a:rPr lang="en-US" b="0" dirty="0" smtClean="0"/>
-              <a:t>, dataset, </a:t>
+              <a:t>, </a:t>
             </a:r>
             <a:r>
               <a:rPr lang="en-US" b="0" dirty="0" err="1" smtClean="0"/>
@@ -11022,7 +11020,15 @@
             </a:r>
             <a:r>
               <a:rPr lang="en-US" b="0" dirty="0" smtClean="0"/>
-              <a:t>, model, …) </a:t>
+              <a:t>, </a:t>
+            </a:r>
+            <a:r>
+              <a:rPr lang="en-US" b="0" dirty="0" smtClean="0"/>
+              <a:t>model=model</a:t>
+            </a:r>
+            <a:r>
+              <a:rPr lang="en-US" b="0" dirty="0" smtClean="0"/>
+              <a:t>, …) </a:t>
             </a:r>
           </a:p>
           <a:p>
@@ -11059,7 +11065,15 @@
             </a:r>
             <a:r>
               <a:rPr lang="en-US" b="0" dirty="0" smtClean="0"/>
-              <a:t>(dataset) </a:t>
+              <a:t>(</a:t>
+            </a:r>
+            <a:r>
+              <a:rPr lang="en-US" b="0" smtClean="0"/>
+              <a:t>model@dataset</a:t>
+            </a:r>
+            <a:r>
+              <a:rPr lang="en-US" b="0" dirty="0" smtClean="0"/>
+              <a:t>) </a:t>
             </a:r>
             <a:r>
               <a:rPr lang="en-US" b="0" dirty="0" err="1" smtClean="0"/>
@@ -11163,7 +11177,19 @@
             </a:r>
             <a:r>
               <a:rPr lang="en-US" b="0" dirty="0" err="1" smtClean="0"/>
-              <a:t>defaultHost,dataset,vpcParams,model</a:t>
+              <a:t>defaultHost</a:t>
+            </a:r>
+            <a:r>
+              <a:rPr lang="en-US" b="0" dirty="0" smtClean="0"/>
+              <a:t> ,</a:t>
+            </a:r>
+            <a:r>
+              <a:rPr lang="en-US" b="0" dirty="0" err="1" smtClean="0"/>
+              <a:t>vpcParams</a:t>
+            </a:r>
+            <a:r>
+              <a:rPr lang="en-US" b="0" dirty="0" smtClean="0"/>
+              <a:t> ,model</a:t>
             </a:r>
             <a:r>
               <a:rPr lang="en-US" b="0" dirty="0" smtClean="0"/>
@@ -12104,16 +12130,16 @@
               <a:t>job = </a:t>
             </a:r>
             <a:r>
-              <a:rPr lang="en-US" dirty="0" err="1"/>
+              <a:rPr lang="en-US" dirty="0" err="1" smtClean="0"/>
               <a:t>sortfit</a:t>
             </a:r>
             <a:r>
-              <a:rPr lang="en-US" b="0" dirty="0"/>
+              <a:rPr lang="en-US" b="0" dirty="0" smtClean="0"/>
               <a:t>(</a:t>
             </a:r>
             <a:r>
-              <a:rPr lang="en-US" b="0" dirty="0" err="1"/>
-              <a:t>defaultHost,dataset,params</a:t>
+              <a:rPr lang="en-US" b="0" dirty="0" err="1" smtClean="0"/>
+              <a:t>defaultHost,params</a:t>
             </a:r>
             <a:r>
               <a:rPr lang="en-US" b="0" dirty="0" smtClean="0"/>
@@ -12195,7 +12221,7 @@
     </p:spTree>
     <p:extLst>
       <p:ext uri="{BB962C8B-B14F-4D97-AF65-F5344CB8AC3E}">
-        <p14:creationId xmlns:p14="http://schemas.microsoft.com/office/powerpoint/2010/main" val="2580689609"/>
+        <p14:creationId xmlns="" xmlns:p14="http://schemas.microsoft.com/office/powerpoint/2010/main" val="2580689609"/>
       </p:ext>
     </p:extLst>
   </p:cSld>
@@ -14660,7 +14686,7 @@
   <a:extraClrSchemeLst/>
   <a:extLst>
     <a:ext uri="{05A4C25C-085E-4340-85A3-A5531E510DB2}">
-      <thm15:themeFamily xmlns:thm15="http://schemas.microsoft.com/office/thememl/2012/main" name="Office Theme" id="{62F939B6-93AF-4DB8-9C6B-D6C7DFDC589F}" vid="{4A3C46E8-61CC-4603-A589-7422A47A8E4A}"/>
+      <thm15:themeFamily xmlns="" xmlns:thm15="http://schemas.microsoft.com/office/thememl/2012/main" name="Office Theme" id="{62F939B6-93AF-4DB8-9C6B-D6C7DFDC589F}" vid="{4A3C46E8-61CC-4603-A589-7422A47A8E4A}"/>
     </a:ext>
   </a:extLst>
 </a:theme>

</xml_diff>